<commit_message>
last modified on API (PUT)
</commit_message>
<xml_diff>
--- a/Sweentened-Airline.pptx
+++ b/Sweentened-Airline.pptx
@@ -8,6 +8,13 @@
     <p:sldId id="256" r:id="rId2"/>
     <p:sldId id="258" r:id="rId3"/>
     <p:sldId id="257" r:id="rId4"/>
+    <p:sldId id="265" r:id="rId5"/>
+    <p:sldId id="259" r:id="rId6"/>
+    <p:sldId id="264" r:id="rId7"/>
+    <p:sldId id="260" r:id="rId8"/>
+    <p:sldId id="261" r:id="rId9"/>
+    <p:sldId id="262" r:id="rId10"/>
+    <p:sldId id="263" r:id="rId11"/>
   </p:sldIdLst>
   <p:sldSz cx="12192000" cy="6858000"/>
   <p:notesSz cx="6858000" cy="9144000"/>
@@ -106,6 +113,11 @@
       </a:defRPr>
     </a:lvl9pPr>
   </p:defaultTextStyle>
+  <p:extLst>
+    <p:ext uri="{EFAFB233-063F-42B5-8137-9DF3F51BA10A}">
+      <p15:sldGuideLst xmlns:p15="http://schemas.microsoft.com/office/powerpoint/2012/main"/>
+    </p:ext>
+  </p:extLst>
 </p:presentation>
 </file>
 
@@ -279,7 +291,7 @@
           <a:p>
             <a:fld id="{48A87A34-81AB-432B-8DAE-1953F412C126}" type="datetimeFigureOut">
               <a:rPr lang="en-US" dirty="0"/>
-              <a:t>11/11/2019</a:t>
+              <a:t>11/12/2019</a:t>
             </a:fld>
             <a:endParaRPr lang="en-US" dirty="0"/>
           </a:p>
@@ -541,7 +553,7 @@
           <a:p>
             <a:fld id="{48A87A34-81AB-432B-8DAE-1953F412C126}" type="datetimeFigureOut">
               <a:rPr lang="en-US" dirty="0"/>
-              <a:t>11/11/2019</a:t>
+              <a:t>11/12/2019</a:t>
             </a:fld>
             <a:endParaRPr lang="en-US" dirty="0"/>
           </a:p>
@@ -768,7 +780,7 @@
             <a:fld id="{48A87A34-81AB-432B-8DAE-1953F412C126}" type="datetimeFigureOut">
               <a:rPr lang="en-US" dirty="0"/>
               <a:pPr/>
-              <a:t>11/11/2019</a:t>
+              <a:t>11/12/2019</a:t>
             </a:fld>
             <a:endParaRPr lang="en-US" dirty="0"/>
           </a:p>
@@ -1074,7 +1086,7 @@
             <a:fld id="{48A87A34-81AB-432B-8DAE-1953F412C126}" type="datetimeFigureOut">
               <a:rPr lang="en-US" dirty="0"/>
               <a:pPr/>
-              <a:t>11/11/2019</a:t>
+              <a:t>11/12/2019</a:t>
             </a:fld>
             <a:endParaRPr lang="en-US" dirty="0"/>
           </a:p>
@@ -1543,7 +1555,7 @@
             <a:fld id="{48A87A34-81AB-432B-8DAE-1953F412C126}" type="datetimeFigureOut">
               <a:rPr lang="en-US" dirty="0"/>
               <a:pPr/>
-              <a:t>11/11/2019</a:t>
+              <a:t>11/12/2019</a:t>
             </a:fld>
             <a:endParaRPr lang="en-US" dirty="0"/>
           </a:p>
@@ -2085,7 +2097,7 @@
           <a:p>
             <a:fld id="{48A87A34-81AB-432B-8DAE-1953F412C126}" type="datetimeFigureOut">
               <a:rPr lang="en-US" dirty="0"/>
-              <a:t>11/11/2019</a:t>
+              <a:t>11/12/2019</a:t>
             </a:fld>
             <a:endParaRPr lang="en-US" dirty="0"/>
           </a:p>
@@ -2854,7 +2866,7 @@
           <a:p>
             <a:fld id="{48A87A34-81AB-432B-8DAE-1953F412C126}" type="datetimeFigureOut">
               <a:rPr lang="en-US" dirty="0"/>
-              <a:t>11/11/2019</a:t>
+              <a:t>11/12/2019</a:t>
             </a:fld>
             <a:endParaRPr lang="en-US" dirty="0"/>
           </a:p>
@@ -3024,7 +3036,7 @@
           <a:p>
             <a:fld id="{48A87A34-81AB-432B-8DAE-1953F412C126}" type="datetimeFigureOut">
               <a:rPr lang="en-US" dirty="0"/>
-              <a:t>11/11/2019</a:t>
+              <a:t>11/12/2019</a:t>
             </a:fld>
             <a:endParaRPr lang="en-US" dirty="0"/>
           </a:p>
@@ -3243,7 +3255,7 @@
             <a:fld id="{48A87A34-81AB-432B-8DAE-1953F412C126}" type="datetimeFigureOut">
               <a:rPr lang="en-US" dirty="0"/>
               <a:pPr/>
-              <a:t>11/11/2019</a:t>
+              <a:t>11/12/2019</a:t>
             </a:fld>
             <a:endParaRPr lang="en-US" dirty="0"/>
           </a:p>
@@ -3418,7 +3430,7 @@
           <a:p>
             <a:fld id="{48A87A34-81AB-432B-8DAE-1953F412C126}" type="datetimeFigureOut">
               <a:rPr lang="en-US" dirty="0"/>
-              <a:t>11/11/2019</a:t>
+              <a:t>11/12/2019</a:t>
             </a:fld>
             <a:endParaRPr lang="en-US" dirty="0"/>
           </a:p>
@@ -3703,7 +3715,7 @@
             <a:fld id="{48A87A34-81AB-432B-8DAE-1953F412C126}" type="datetimeFigureOut">
               <a:rPr lang="en-US" dirty="0"/>
               <a:pPr/>
-              <a:t>11/11/2019</a:t>
+              <a:t>11/12/2019</a:t>
             </a:fld>
             <a:endParaRPr lang="en-US" dirty="0"/>
           </a:p>
@@ -3940,7 +3952,7 @@
           <a:p>
             <a:fld id="{48A87A34-81AB-432B-8DAE-1953F412C126}" type="datetimeFigureOut">
               <a:rPr lang="en-US" dirty="0"/>
-              <a:t>11/11/2019</a:t>
+              <a:t>11/12/2019</a:t>
             </a:fld>
             <a:endParaRPr lang="en-US" dirty="0"/>
           </a:p>
@@ -4314,7 +4326,7 @@
           <a:p>
             <a:fld id="{48A87A34-81AB-432B-8DAE-1953F412C126}" type="datetimeFigureOut">
               <a:rPr lang="en-US" dirty="0"/>
-              <a:t>11/11/2019</a:t>
+              <a:t>11/12/2019</a:t>
             </a:fld>
             <a:endParaRPr lang="en-US" dirty="0"/>
           </a:p>
@@ -4427,7 +4439,7 @@
           <a:p>
             <a:fld id="{48A87A34-81AB-432B-8DAE-1953F412C126}" type="datetimeFigureOut">
               <a:rPr lang="en-US" dirty="0"/>
-              <a:t>11/11/2019</a:t>
+              <a:t>11/12/2019</a:t>
             </a:fld>
             <a:endParaRPr lang="en-US" dirty="0"/>
           </a:p>
@@ -4517,7 +4529,7 @@
           <a:p>
             <a:fld id="{48A87A34-81AB-432B-8DAE-1953F412C126}" type="datetimeFigureOut">
               <a:rPr lang="en-US" dirty="0"/>
-              <a:t>11/11/2019</a:t>
+              <a:t>11/12/2019</a:t>
             </a:fld>
             <a:endParaRPr lang="en-US" dirty="0"/>
           </a:p>
@@ -4761,7 +4773,7 @@
           <a:p>
             <a:fld id="{48A87A34-81AB-432B-8DAE-1953F412C126}" type="datetimeFigureOut">
               <a:rPr lang="en-US" dirty="0"/>
-              <a:t>11/11/2019</a:t>
+              <a:t>11/12/2019</a:t>
             </a:fld>
             <a:endParaRPr lang="en-US" dirty="0"/>
           </a:p>
@@ -5013,7 +5025,7 @@
           <a:p>
             <a:fld id="{48A87A34-81AB-432B-8DAE-1953F412C126}" type="datetimeFigureOut">
               <a:rPr lang="en-US" dirty="0"/>
-              <a:t>11/11/2019</a:t>
+              <a:t>11/12/2019</a:t>
             </a:fld>
             <a:endParaRPr lang="en-US" dirty="0"/>
           </a:p>
@@ -5252,7 +5264,7 @@
             <a:fld id="{48A87A34-81AB-432B-8DAE-1953F412C126}" type="datetimeFigureOut">
               <a:rPr lang="en-US" dirty="0"/>
               <a:pPr/>
-              <a:t>11/11/2019</a:t>
+              <a:t>11/12/2019</a:t>
             </a:fld>
             <a:endParaRPr lang="en-US" dirty="0"/>
           </a:p>
@@ -5730,13 +5742,214 @@
             <p:ph type="subTitle" idx="1"/>
           </p:nvPr>
         </p:nvSpPr>
-        <p:spPr/>
-        <p:txBody>
-          <a:bodyPr/>
+        <p:spPr>
+          <a:xfrm>
+            <a:off x="0" y="6515100"/>
+            <a:ext cx="9448800" cy="685800"/>
+          </a:xfrm>
+        </p:spPr>
+        <p:txBody>
+          <a:bodyPr>
+            <a:normAutofit/>
+          </a:bodyPr>
           <a:lstStyle/>
           <a:p>
             <a:r>
-              <a:rPr lang="en-US" dirty="0" smtClean="0"/>
+              <a:rPr lang="en-US" sz="1100" dirty="0" smtClean="0"/>
+              <a:t>D</a:t>
+            </a:r>
+            <a:endParaRPr lang="en-US" sz="1100" dirty="0"/>
+          </a:p>
+        </p:txBody>
+      </p:sp>
+      <p:sp>
+        <p:nvSpPr>
+          <p:cNvPr id="5" name="副標題 2"/>
+          <p:cNvSpPr txBox="1">
+            <a:spLocks/>
+          </p:cNvSpPr>
+          <p:nvPr/>
+        </p:nvSpPr>
+        <p:spPr>
+          <a:xfrm>
+            <a:off x="1524000" y="3670301"/>
+            <a:ext cx="9448800" cy="685800"/>
+          </a:xfrm>
+          <a:prstGeom prst="rect">
+            <a:avLst/>
+          </a:prstGeom>
+        </p:spPr>
+        <p:txBody>
+          <a:bodyPr vert="horz" lIns="91440" tIns="45720" rIns="91440" bIns="45720" rtlCol="0">
+            <a:normAutofit/>
+          </a:bodyPr>
+          <a:lstStyle>
+            <a:lvl1pPr marL="0" indent="0" algn="l" defTabSz="914400" rtl="0" eaLnBrk="1" latinLnBrk="0" hangingPunct="1">
+              <a:lnSpc>
+                <a:spcPct val="90000"/>
+              </a:lnSpc>
+              <a:spcBef>
+                <a:spcPts val="1000"/>
+              </a:spcBef>
+              <a:buFont typeface="Arial" panose="020B0604020202020204" pitchFamily="34" charset="0"/>
+              <a:buNone/>
+              <a:defRPr sz="2000" kern="1200">
+                <a:solidFill>
+                  <a:schemeClr val="tx1"/>
+                </a:solidFill>
+                <a:latin typeface="+mn-lt"/>
+                <a:ea typeface="+mn-ea"/>
+                <a:cs typeface="+mn-cs"/>
+              </a:defRPr>
+            </a:lvl1pPr>
+            <a:lvl2pPr marL="457200" indent="0" algn="ctr" defTabSz="914400" rtl="0" eaLnBrk="1" latinLnBrk="0" hangingPunct="1">
+              <a:lnSpc>
+                <a:spcPct val="90000"/>
+              </a:lnSpc>
+              <a:spcBef>
+                <a:spcPts val="500"/>
+              </a:spcBef>
+              <a:buFont typeface="Arial" panose="020B0604020202020204" pitchFamily="34" charset="0"/>
+              <a:buNone/>
+              <a:defRPr sz="2000" kern="1200">
+                <a:solidFill>
+                  <a:schemeClr val="tx1"/>
+                </a:solidFill>
+                <a:latin typeface="+mn-lt"/>
+                <a:ea typeface="+mn-ea"/>
+                <a:cs typeface="+mn-cs"/>
+              </a:defRPr>
+            </a:lvl2pPr>
+            <a:lvl3pPr marL="914400" indent="0" algn="ctr" defTabSz="914400" rtl="0" eaLnBrk="1" latinLnBrk="0" hangingPunct="1">
+              <a:lnSpc>
+                <a:spcPct val="90000"/>
+              </a:lnSpc>
+              <a:spcBef>
+                <a:spcPts val="500"/>
+              </a:spcBef>
+              <a:buFont typeface="Arial" panose="020B0604020202020204" pitchFamily="34" charset="0"/>
+              <a:buNone/>
+              <a:defRPr sz="1800" kern="1200">
+                <a:solidFill>
+                  <a:schemeClr val="tx1"/>
+                </a:solidFill>
+                <a:latin typeface="+mn-lt"/>
+                <a:ea typeface="+mn-ea"/>
+                <a:cs typeface="+mn-cs"/>
+              </a:defRPr>
+            </a:lvl3pPr>
+            <a:lvl4pPr marL="1371600" indent="0" algn="ctr" defTabSz="914400" rtl="0" eaLnBrk="1" latinLnBrk="0" hangingPunct="1">
+              <a:lnSpc>
+                <a:spcPct val="90000"/>
+              </a:lnSpc>
+              <a:spcBef>
+                <a:spcPts val="500"/>
+              </a:spcBef>
+              <a:buFont typeface="Arial" panose="020B0604020202020204" pitchFamily="34" charset="0"/>
+              <a:buNone/>
+              <a:defRPr sz="1600" kern="1200">
+                <a:solidFill>
+                  <a:schemeClr val="tx1"/>
+                </a:solidFill>
+                <a:latin typeface="+mn-lt"/>
+                <a:ea typeface="+mn-ea"/>
+                <a:cs typeface="+mn-cs"/>
+              </a:defRPr>
+            </a:lvl4pPr>
+            <a:lvl5pPr marL="1828800" indent="0" algn="ctr" defTabSz="914400" rtl="0" eaLnBrk="1" latinLnBrk="0" hangingPunct="1">
+              <a:lnSpc>
+                <a:spcPct val="90000"/>
+              </a:lnSpc>
+              <a:spcBef>
+                <a:spcPts val="500"/>
+              </a:spcBef>
+              <a:buFont typeface="Arial" panose="020B0604020202020204" pitchFamily="34" charset="0"/>
+              <a:buNone/>
+              <a:defRPr sz="1600" kern="1200">
+                <a:solidFill>
+                  <a:schemeClr val="tx1"/>
+                </a:solidFill>
+                <a:latin typeface="+mn-lt"/>
+                <a:ea typeface="+mn-ea"/>
+                <a:cs typeface="+mn-cs"/>
+              </a:defRPr>
+            </a:lvl5pPr>
+            <a:lvl6pPr marL="2286000" indent="0" algn="ctr" defTabSz="914400" rtl="0" eaLnBrk="1" latinLnBrk="0" hangingPunct="1">
+              <a:lnSpc>
+                <a:spcPct val="90000"/>
+              </a:lnSpc>
+              <a:spcBef>
+                <a:spcPts val="500"/>
+              </a:spcBef>
+              <a:buFont typeface="Arial" panose="020B0604020202020204" pitchFamily="34" charset="0"/>
+              <a:buNone/>
+              <a:defRPr sz="1600" kern="1200">
+                <a:solidFill>
+                  <a:schemeClr val="tx1"/>
+                </a:solidFill>
+                <a:latin typeface="+mn-lt"/>
+                <a:ea typeface="+mn-ea"/>
+                <a:cs typeface="+mn-cs"/>
+              </a:defRPr>
+            </a:lvl6pPr>
+            <a:lvl7pPr marL="2743200" indent="0" algn="ctr" defTabSz="914400" rtl="0" eaLnBrk="1" latinLnBrk="0" hangingPunct="1">
+              <a:lnSpc>
+                <a:spcPct val="90000"/>
+              </a:lnSpc>
+              <a:spcBef>
+                <a:spcPts val="500"/>
+              </a:spcBef>
+              <a:buFont typeface="Arial" panose="020B0604020202020204" pitchFamily="34" charset="0"/>
+              <a:buNone/>
+              <a:defRPr sz="1600" kern="1200">
+                <a:solidFill>
+                  <a:schemeClr val="tx1"/>
+                </a:solidFill>
+                <a:latin typeface="+mn-lt"/>
+                <a:ea typeface="+mn-ea"/>
+                <a:cs typeface="+mn-cs"/>
+              </a:defRPr>
+            </a:lvl7pPr>
+            <a:lvl8pPr marL="3200400" indent="0" algn="ctr" defTabSz="914400" rtl="0" eaLnBrk="1" latinLnBrk="0" hangingPunct="1">
+              <a:lnSpc>
+                <a:spcPct val="90000"/>
+              </a:lnSpc>
+              <a:spcBef>
+                <a:spcPts val="500"/>
+              </a:spcBef>
+              <a:buFont typeface="Arial" panose="020B0604020202020204" pitchFamily="34" charset="0"/>
+              <a:buNone/>
+              <a:defRPr sz="1600" kern="1200">
+                <a:solidFill>
+                  <a:schemeClr val="tx1"/>
+                </a:solidFill>
+                <a:latin typeface="+mn-lt"/>
+                <a:ea typeface="+mn-ea"/>
+                <a:cs typeface="+mn-cs"/>
+              </a:defRPr>
+            </a:lvl8pPr>
+            <a:lvl9pPr marL="3657600" indent="0" algn="ctr" defTabSz="914400" rtl="0" eaLnBrk="1" latinLnBrk="0" hangingPunct="1">
+              <a:lnSpc>
+                <a:spcPct val="90000"/>
+              </a:lnSpc>
+              <a:spcBef>
+                <a:spcPts val="500"/>
+              </a:spcBef>
+              <a:buFont typeface="Arial" panose="020B0604020202020204" pitchFamily="34" charset="0"/>
+              <a:buNone/>
+              <a:defRPr sz="1600" kern="1200">
+                <a:solidFill>
+                  <a:schemeClr val="tx1"/>
+                </a:solidFill>
+                <a:latin typeface="+mn-lt"/>
+                <a:ea typeface="+mn-ea"/>
+                <a:cs typeface="+mn-cs"/>
+              </a:defRPr>
+            </a:lvl9pPr>
+          </a:lstStyle>
+          <a:p>
+            <a:r>
+              <a:rPr lang="en-US" smtClean="0"/>
               <a:t>Hsuan-Yu(Sam) Lin, Wesley Tang, Tri Nguyen, Dominik Johnson</a:t>
             </a:r>
             <a:endParaRPr lang="en-US" dirty="0"/>
@@ -5753,6 +5966,93 @@
   <p:clrMapOvr>
     <a:masterClrMapping/>
   </p:clrMapOvr>
+  <p:timing>
+    <p:tnLst>
+      <p:par>
+        <p:cTn id="1" dur="indefinite" restart="never" nodeType="tmRoot"/>
+      </p:par>
+    </p:tnLst>
+  </p:timing>
+</p:sld>
+</file>
+
+<file path=ppt/slides/slide10.xml><?xml version="1.0" encoding="utf-8"?>
+<p:sld xmlns:a="http://schemas.openxmlformats.org/drawingml/2006/main" xmlns:r="http://schemas.openxmlformats.org/officeDocument/2006/relationships" xmlns:p="http://schemas.openxmlformats.org/presentationml/2006/main">
+  <p:cSld>
+    <p:spTree>
+      <p:nvGrpSpPr>
+        <p:cNvPr id="1" name=""/>
+        <p:cNvGrpSpPr/>
+        <p:nvPr/>
+      </p:nvGrpSpPr>
+      <p:grpSpPr>
+        <a:xfrm>
+          <a:off x="0" y="0"/>
+          <a:ext cx="0" cy="0"/>
+          <a:chOff x="0" y="0"/>
+          <a:chExt cx="0" cy="0"/>
+        </a:xfrm>
+      </p:grpSpPr>
+      <p:sp>
+        <p:nvSpPr>
+          <p:cNvPr id="4" name="標題 3"/>
+          <p:cNvSpPr>
+            <a:spLocks noGrp="1"/>
+          </p:cNvSpPr>
+          <p:nvPr>
+            <p:ph type="ctrTitle"/>
+          </p:nvPr>
+        </p:nvSpPr>
+        <p:spPr/>
+        <p:txBody>
+          <a:bodyPr/>
+          <a:lstStyle/>
+          <a:p>
+            <a:pPr algn="ctr"/>
+            <a:r>
+              <a:rPr lang="en-US" dirty="0" smtClean="0"/>
+              <a:t>Questions?</a:t>
+            </a:r>
+            <a:endParaRPr lang="en-US" dirty="0"/>
+          </a:p>
+        </p:txBody>
+      </p:sp>
+      <p:sp>
+        <p:nvSpPr>
+          <p:cNvPr id="5" name="副標題 4"/>
+          <p:cNvSpPr>
+            <a:spLocks noGrp="1"/>
+          </p:cNvSpPr>
+          <p:nvPr>
+            <p:ph type="subTitle" idx="1"/>
+          </p:nvPr>
+        </p:nvSpPr>
+        <p:spPr/>
+        <p:txBody>
+          <a:bodyPr/>
+          <a:lstStyle/>
+          <a:p>
+            <a:endParaRPr lang="en-US"/>
+          </a:p>
+        </p:txBody>
+      </p:sp>
+    </p:spTree>
+    <p:extLst>
+      <p:ext uri="{BB962C8B-B14F-4D97-AF65-F5344CB8AC3E}">
+        <p14:creationId xmlns:p14="http://schemas.microsoft.com/office/powerpoint/2010/main" val="1126847248"/>
+      </p:ext>
+    </p:extLst>
+  </p:cSld>
+  <p:clrMapOvr>
+    <a:masterClrMapping/>
+  </p:clrMapOvr>
+  <p:timing>
+    <p:tnLst>
+      <p:par>
+        <p:cTn id="1" dur="indefinite" restart="never" nodeType="tmRoot"/>
+      </p:par>
+    </p:tnLst>
+  </p:timing>
 </p:sld>
 </file>
 
@@ -5836,6 +6136,200 @@
           </a:p>
         </p:txBody>
       </p:sp>
+      <p:sp>
+        <p:nvSpPr>
+          <p:cNvPr id="4" name="副標題 2"/>
+          <p:cNvSpPr txBox="1">
+            <a:spLocks/>
+          </p:cNvSpPr>
+          <p:nvPr/>
+        </p:nvSpPr>
+        <p:spPr>
+          <a:xfrm>
+            <a:off x="-228600" y="6576646"/>
+            <a:ext cx="9448800" cy="685800"/>
+          </a:xfrm>
+          <a:prstGeom prst="rect">
+            <a:avLst/>
+          </a:prstGeom>
+        </p:spPr>
+        <p:txBody>
+          <a:bodyPr vert="horz" lIns="91440" tIns="45720" rIns="91440" bIns="45720" rtlCol="0">
+            <a:normAutofit/>
+          </a:bodyPr>
+          <a:lstStyle>
+            <a:lvl1pPr marL="228600" indent="-228600" algn="l" defTabSz="914400" rtl="0" eaLnBrk="1" latinLnBrk="0" hangingPunct="1">
+              <a:lnSpc>
+                <a:spcPct val="90000"/>
+              </a:lnSpc>
+              <a:spcBef>
+                <a:spcPts val="1000"/>
+              </a:spcBef>
+              <a:buFont typeface="Arial" panose="020B0604020202020204" pitchFamily="34" charset="0"/>
+              <a:buChar char="•"/>
+              <a:defRPr sz="2200" kern="1200">
+                <a:solidFill>
+                  <a:schemeClr val="tx1"/>
+                </a:solidFill>
+                <a:latin typeface="+mn-lt"/>
+                <a:ea typeface="+mn-ea"/>
+                <a:cs typeface="+mn-cs"/>
+              </a:defRPr>
+            </a:lvl1pPr>
+            <a:lvl2pPr marL="685800" indent="-228600" algn="l" defTabSz="914400" rtl="0" eaLnBrk="1" latinLnBrk="0" hangingPunct="1">
+              <a:lnSpc>
+                <a:spcPct val="90000"/>
+              </a:lnSpc>
+              <a:spcBef>
+                <a:spcPts val="500"/>
+              </a:spcBef>
+              <a:buFont typeface="Arial" panose="020B0604020202020204" pitchFamily="34" charset="0"/>
+              <a:buChar char="•"/>
+              <a:defRPr sz="2000" kern="1200">
+                <a:solidFill>
+                  <a:schemeClr val="tx1"/>
+                </a:solidFill>
+                <a:latin typeface="+mn-lt"/>
+                <a:ea typeface="+mn-ea"/>
+                <a:cs typeface="+mn-cs"/>
+              </a:defRPr>
+            </a:lvl2pPr>
+            <a:lvl3pPr marL="1143000" indent="-228600" algn="l" defTabSz="914400" rtl="0" eaLnBrk="1" latinLnBrk="0" hangingPunct="1">
+              <a:lnSpc>
+                <a:spcPct val="90000"/>
+              </a:lnSpc>
+              <a:spcBef>
+                <a:spcPts val="500"/>
+              </a:spcBef>
+              <a:buFont typeface="Arial" panose="020B0604020202020204" pitchFamily="34" charset="0"/>
+              <a:buChar char="•"/>
+              <a:defRPr sz="1800" kern="1200">
+                <a:solidFill>
+                  <a:schemeClr val="tx1"/>
+                </a:solidFill>
+                <a:latin typeface="+mn-lt"/>
+                <a:ea typeface="+mn-ea"/>
+                <a:cs typeface="+mn-cs"/>
+              </a:defRPr>
+            </a:lvl3pPr>
+            <a:lvl4pPr marL="1600200" indent="-228600" algn="l" defTabSz="914400" rtl="0" eaLnBrk="1" latinLnBrk="0" hangingPunct="1">
+              <a:lnSpc>
+                <a:spcPct val="90000"/>
+              </a:lnSpc>
+              <a:spcBef>
+                <a:spcPts val="500"/>
+              </a:spcBef>
+              <a:buFont typeface="Arial" panose="020B0604020202020204" pitchFamily="34" charset="0"/>
+              <a:buChar char="•"/>
+              <a:defRPr sz="1600" kern="1200">
+                <a:solidFill>
+                  <a:schemeClr val="tx1"/>
+                </a:solidFill>
+                <a:latin typeface="+mn-lt"/>
+                <a:ea typeface="+mn-ea"/>
+                <a:cs typeface="+mn-cs"/>
+              </a:defRPr>
+            </a:lvl4pPr>
+            <a:lvl5pPr marL="2057400" indent="-228600" algn="l" defTabSz="914400" rtl="0" eaLnBrk="1" latinLnBrk="0" hangingPunct="1">
+              <a:lnSpc>
+                <a:spcPct val="90000"/>
+              </a:lnSpc>
+              <a:spcBef>
+                <a:spcPts val="500"/>
+              </a:spcBef>
+              <a:buFont typeface="Arial" panose="020B0604020202020204" pitchFamily="34" charset="0"/>
+              <a:buChar char="•"/>
+              <a:defRPr sz="1600" kern="1200">
+                <a:solidFill>
+                  <a:schemeClr val="tx1"/>
+                </a:solidFill>
+                <a:latin typeface="+mn-lt"/>
+                <a:ea typeface="+mn-ea"/>
+                <a:cs typeface="+mn-cs"/>
+              </a:defRPr>
+            </a:lvl5pPr>
+            <a:lvl6pPr marL="2514600" indent="-228600" algn="l" defTabSz="914400" rtl="0" eaLnBrk="1" latinLnBrk="0" hangingPunct="1">
+              <a:lnSpc>
+                <a:spcPct val="90000"/>
+              </a:lnSpc>
+              <a:spcBef>
+                <a:spcPts val="500"/>
+              </a:spcBef>
+              <a:buFont typeface="Arial" panose="020B0604020202020204" pitchFamily="34" charset="0"/>
+              <a:buChar char="•"/>
+              <a:defRPr sz="1600" kern="1200">
+                <a:solidFill>
+                  <a:schemeClr val="tx1"/>
+                </a:solidFill>
+                <a:latin typeface="+mn-lt"/>
+                <a:ea typeface="+mn-ea"/>
+                <a:cs typeface="+mn-cs"/>
+              </a:defRPr>
+            </a:lvl6pPr>
+            <a:lvl7pPr marL="2971800" indent="-228600" algn="l" defTabSz="914400" rtl="0" eaLnBrk="1" latinLnBrk="0" hangingPunct="1">
+              <a:lnSpc>
+                <a:spcPct val="90000"/>
+              </a:lnSpc>
+              <a:spcBef>
+                <a:spcPts val="500"/>
+              </a:spcBef>
+              <a:buFont typeface="Arial" panose="020B0604020202020204" pitchFamily="34" charset="0"/>
+              <a:buChar char="•"/>
+              <a:defRPr sz="1600" kern="1200">
+                <a:solidFill>
+                  <a:schemeClr val="tx1"/>
+                </a:solidFill>
+                <a:latin typeface="+mn-lt"/>
+                <a:ea typeface="+mn-ea"/>
+                <a:cs typeface="+mn-cs"/>
+              </a:defRPr>
+            </a:lvl7pPr>
+            <a:lvl8pPr marL="3429000" indent="-228600" algn="l" defTabSz="914400" rtl="0" eaLnBrk="1" latinLnBrk="0" hangingPunct="1">
+              <a:lnSpc>
+                <a:spcPct val="90000"/>
+              </a:lnSpc>
+              <a:spcBef>
+                <a:spcPts val="500"/>
+              </a:spcBef>
+              <a:buFont typeface="Arial" panose="020B0604020202020204" pitchFamily="34" charset="0"/>
+              <a:buChar char="•"/>
+              <a:defRPr sz="1600" kern="1200">
+                <a:solidFill>
+                  <a:schemeClr val="tx1"/>
+                </a:solidFill>
+                <a:latin typeface="+mn-lt"/>
+                <a:ea typeface="+mn-ea"/>
+                <a:cs typeface="+mn-cs"/>
+              </a:defRPr>
+            </a:lvl8pPr>
+            <a:lvl9pPr marL="3886200" indent="-228600" algn="l" defTabSz="914400" rtl="0" eaLnBrk="1" latinLnBrk="0" hangingPunct="1">
+              <a:lnSpc>
+                <a:spcPct val="90000"/>
+              </a:lnSpc>
+              <a:spcBef>
+                <a:spcPts val="500"/>
+              </a:spcBef>
+              <a:buFont typeface="Arial" panose="020B0604020202020204" pitchFamily="34" charset="0"/>
+              <a:buChar char="•"/>
+              <a:defRPr sz="1600" kern="1200">
+                <a:solidFill>
+                  <a:schemeClr val="tx1"/>
+                </a:solidFill>
+                <a:latin typeface="+mn-lt"/>
+                <a:ea typeface="+mn-ea"/>
+                <a:cs typeface="+mn-cs"/>
+              </a:defRPr>
+            </a:lvl9pPr>
+          </a:lstStyle>
+          <a:p>
+            <a:r>
+              <a:rPr lang="en-US" sz="1100" smtClean="0"/>
+              <a:t>D</a:t>
+            </a:r>
+            <a:endParaRPr lang="en-US" sz="1100" dirty="0"/>
+          </a:p>
+        </p:txBody>
+      </p:sp>
     </p:spTree>
     <p:extLst>
       <p:ext uri="{BB962C8B-B14F-4D97-AF65-F5344CB8AC3E}">
@@ -5846,6 +6340,13 @@
   <p:clrMapOvr>
     <a:masterClrMapping/>
   </p:clrMapOvr>
+  <p:timing>
+    <p:tnLst>
+      <p:par>
+        <p:cTn id="1" dur="indefinite" restart="never" nodeType="tmRoot"/>
+      </p:par>
+    </p:tnLst>
+  </p:timing>
 </p:sld>
 </file>
 
@@ -5901,13 +6402,11 @@
         </p:nvSpPr>
         <p:spPr/>
         <p:txBody>
-          <a:bodyPr/>
+          <a:bodyPr>
+            <a:normAutofit/>
+          </a:bodyPr>
           <a:lstStyle/>
           <a:p>
-            <a:r>
-              <a:rPr lang="en-US" sz="2800" dirty="0" smtClean="0"/>
-              <a:t>Frond-End UI with </a:t>
-            </a:r>
             <a:r>
               <a:rPr lang="en-US" sz="2800" dirty="0" smtClean="0">
                 <a:solidFill>
@@ -5916,19 +6415,11 @@
                   </a:schemeClr>
                 </a:solidFill>
               </a:rPr>
-              <a:t>Angular</a:t>
+              <a:t>Draw.io</a:t>
             </a:r>
             <a:r>
               <a:rPr lang="en-US" sz="2800" dirty="0" smtClean="0"/>
-              <a:t>(</a:t>
-            </a:r>
-            <a:r>
-              <a:rPr lang="en-US" sz="2800" dirty="0" err="1" smtClean="0"/>
-              <a:t>TypeScript</a:t>
-            </a:r>
-            <a:r>
-              <a:rPr lang="en-US" sz="2800" dirty="0" smtClean="0"/>
-              <a:t>), </a:t>
+              <a:t> and </a:t>
             </a:r>
             <a:r>
               <a:rPr lang="en-US" sz="2800" dirty="0" smtClean="0">
@@ -5938,11 +6429,17 @@
                   </a:schemeClr>
                 </a:solidFill>
               </a:rPr>
-              <a:t>HTML</a:t>
+              <a:t>dbdiagram.io</a:t>
             </a:r>
             <a:r>
               <a:rPr lang="en-US" sz="2800" dirty="0" smtClean="0"/>
-              <a:t> and </a:t>
+              <a:t> to create script</a:t>
+            </a:r>
+          </a:p>
+          <a:p>
+            <a:r>
+              <a:rPr lang="en-US" sz="2800" dirty="0" smtClean="0"/>
+              <a:t>Frond-End UI with </a:t>
             </a:r>
             <a:r>
               <a:rPr lang="en-US" sz="2800" dirty="0" smtClean="0">
@@ -5952,13 +6449,19 @@
                   </a:schemeClr>
                 </a:solidFill>
               </a:rPr>
-              <a:t>CSS</a:t>
-            </a:r>
-          </a:p>
-          <a:p>
+              <a:t>Angular</a:t>
+            </a:r>
             <a:r>
               <a:rPr lang="en-US" sz="2800" dirty="0" smtClean="0"/>
-              <a:t>Back-End Business Logic with </a:t>
+              <a:t>(</a:t>
+            </a:r>
+            <a:r>
+              <a:rPr lang="en-US" sz="2800" dirty="0" err="1" smtClean="0"/>
+              <a:t>TypeScript</a:t>
+            </a:r>
+            <a:r>
+              <a:rPr lang="en-US" sz="2800" dirty="0" smtClean="0"/>
+              <a:t>), </a:t>
             </a:r>
             <a:r>
               <a:rPr lang="en-US" sz="2800" dirty="0" smtClean="0">
@@ -5968,17 +6471,11 @@
                   </a:schemeClr>
                 </a:solidFill>
               </a:rPr>
-              <a:t>C#</a:t>
+              <a:t>HTML</a:t>
             </a:r>
             <a:r>
               <a:rPr lang="en-US" sz="2800" dirty="0" smtClean="0"/>
-              <a:t> with .NET Core</a:t>
-            </a:r>
-          </a:p>
-          <a:p>
-            <a:r>
-              <a:rPr lang="en-US" sz="2800" dirty="0" smtClean="0"/>
-              <a:t>Back-End Data Access with ADO.NET </a:t>
+              <a:t> and </a:t>
             </a:r>
             <a:r>
               <a:rPr lang="en-US" sz="2800" dirty="0" smtClean="0">
@@ -5988,11 +6485,13 @@
                   </a:schemeClr>
                 </a:solidFill>
               </a:rPr>
-              <a:t>EF</a:t>
-            </a:r>
+              <a:t>CSS</a:t>
+            </a:r>
+          </a:p>
+          <a:p>
             <a:r>
               <a:rPr lang="en-US" sz="2800" dirty="0" smtClean="0"/>
-              <a:t> and </a:t>
+              <a:t>Back-End Business Logic with </a:t>
             </a:r>
             <a:r>
               <a:rPr lang="en-US" sz="2800" dirty="0" smtClean="0">
@@ -6002,23 +6501,57 @@
                   </a:schemeClr>
                 </a:solidFill>
               </a:rPr>
-              <a:t>PostgreSQL</a:t>
-            </a:r>
-          </a:p>
-          <a:p>
+              <a:t>C#</a:t>
+            </a:r>
             <a:r>
               <a:rPr lang="en-US" sz="2800" dirty="0" smtClean="0"/>
-              <a:t>Unit Test with </a:t>
-            </a:r>
-            <a:r>
-              <a:rPr lang="en-US" sz="2800" dirty="0" err="1" smtClean="0">
+              <a:t> with .NET Core</a:t>
+            </a:r>
+          </a:p>
+          <a:p>
+            <a:r>
+              <a:rPr lang="en-US" sz="2800" dirty="0" smtClean="0"/>
+              <a:t>Back-End Data Access with ADO.NET </a:t>
+            </a:r>
+            <a:r>
+              <a:rPr lang="en-US" sz="2800" dirty="0" smtClean="0">
                 <a:solidFill>
                   <a:schemeClr val="accent6">
                     <a:lumMod val="75000"/>
                   </a:schemeClr>
                 </a:solidFill>
               </a:rPr>
-              <a:t>xUnit</a:t>
+              <a:t>EF</a:t>
+            </a:r>
+            <a:r>
+              <a:rPr lang="en-US" sz="2800" dirty="0" smtClean="0"/>
+              <a:t> and </a:t>
+            </a:r>
+            <a:r>
+              <a:rPr lang="en-US" sz="2800" dirty="0" smtClean="0">
+                <a:solidFill>
+                  <a:schemeClr val="accent6">
+                    <a:lumMod val="75000"/>
+                  </a:schemeClr>
+                </a:solidFill>
+              </a:rPr>
+              <a:t>PostgreSQL</a:t>
+            </a:r>
+          </a:p>
+          <a:p>
+            <a:r>
+              <a:rPr lang="en-US" sz="2800" dirty="0" smtClean="0"/>
+              <a:t>Checked Code Quality with </a:t>
+            </a:r>
+            <a:r>
+              <a:rPr lang="en-US" sz="2800" dirty="0" err="1" smtClean="0">
+                <a:solidFill>
+                  <a:schemeClr val="accent6">
+                    <a:lumMod val="75000"/>
+                  </a:schemeClr>
+                </a:solidFill>
+              </a:rPr>
+              <a:t>SonarCloud</a:t>
             </a:r>
             <a:endParaRPr lang="en-US" sz="2800" dirty="0" smtClean="0">
               <a:solidFill>
@@ -6031,81 +6564,229 @@
           <a:p>
             <a:r>
               <a:rPr lang="en-US" sz="2800" dirty="0" smtClean="0"/>
-              <a:t>Tested API with </a:t>
-            </a:r>
-            <a:r>
-              <a:rPr lang="en-US" sz="2800" dirty="0" err="1" smtClean="0">
+              <a:t>Use </a:t>
+            </a:r>
+            <a:r>
+              <a:rPr lang="en-US" sz="2800" dirty="0" smtClean="0">
                 <a:solidFill>
                   <a:schemeClr val="accent6">
                     <a:lumMod val="75000"/>
                   </a:schemeClr>
                 </a:solidFill>
               </a:rPr>
-              <a:t>PostMan</a:t>
-            </a:r>
-            <a:endParaRPr lang="en-US" sz="2800" dirty="0" smtClean="0">
-              <a:solidFill>
-                <a:schemeClr val="accent6">
-                  <a:lumMod val="75000"/>
-                </a:schemeClr>
-              </a:solidFill>
-            </a:endParaRPr>
-          </a:p>
-          <a:p>
+              <a:t>Azure Pipeline </a:t>
+            </a:r>
             <a:r>
               <a:rPr lang="en-US" sz="2800" dirty="0" smtClean="0"/>
-              <a:t>Checked Code Quality with </a:t>
-            </a:r>
-            <a:r>
-              <a:rPr lang="en-US" sz="2800" dirty="0" err="1" smtClean="0">
+              <a:t>to build, test and deploy application to </a:t>
+            </a:r>
+            <a:r>
+              <a:rPr lang="en-US" sz="2800" dirty="0" smtClean="0">
                 <a:solidFill>
                   <a:schemeClr val="accent6">
                     <a:lumMod val="75000"/>
                   </a:schemeClr>
                 </a:solidFill>
               </a:rPr>
-              <a:t>SonarCloud</a:t>
-            </a:r>
-            <a:endParaRPr lang="en-US" sz="2800" dirty="0" smtClean="0">
-              <a:solidFill>
-                <a:schemeClr val="accent6">
-                  <a:lumMod val="75000"/>
-                </a:schemeClr>
-              </a:solidFill>
-            </a:endParaRPr>
-          </a:p>
-          <a:p>
-            <a:r>
-              <a:rPr lang="en-US" sz="2800" dirty="0" smtClean="0"/>
-              <a:t>Use </a:t>
-            </a:r>
-            <a:r>
-              <a:rPr lang="en-US" sz="2800" dirty="0" smtClean="0">
-                <a:solidFill>
-                  <a:schemeClr val="accent6">
-                    <a:lumMod val="75000"/>
-                  </a:schemeClr>
-                </a:solidFill>
-              </a:rPr>
-              <a:t>Azure Pipeline </a:t>
-            </a:r>
-            <a:r>
-              <a:rPr lang="en-US" sz="2800" dirty="0" smtClean="0"/>
-              <a:t>to build, test and deploy application to </a:t>
-            </a:r>
-            <a:r>
-              <a:rPr lang="en-US" sz="2800" dirty="0" smtClean="0">
-                <a:solidFill>
-                  <a:schemeClr val="accent6">
-                    <a:lumMod val="75000"/>
-                  </a:schemeClr>
-                </a:solidFill>
-              </a:rPr>
               <a:t>Azure App Service</a:t>
             </a:r>
           </a:p>
           <a:p>
             <a:endParaRPr lang="en-US" dirty="0" smtClean="0"/>
+          </a:p>
+        </p:txBody>
+      </p:sp>
+      <p:sp>
+        <p:nvSpPr>
+          <p:cNvPr id="4" name="副標題 2"/>
+          <p:cNvSpPr txBox="1">
+            <a:spLocks/>
+          </p:cNvSpPr>
+          <p:nvPr/>
+        </p:nvSpPr>
+        <p:spPr>
+          <a:xfrm>
+            <a:off x="-193431" y="6594231"/>
+            <a:ext cx="9448800" cy="685800"/>
+          </a:xfrm>
+          <a:prstGeom prst="rect">
+            <a:avLst/>
+          </a:prstGeom>
+        </p:spPr>
+        <p:txBody>
+          <a:bodyPr vert="horz" lIns="91440" tIns="45720" rIns="91440" bIns="45720" rtlCol="0">
+            <a:normAutofit/>
+          </a:bodyPr>
+          <a:lstStyle>
+            <a:lvl1pPr marL="228600" indent="-228600" algn="l" defTabSz="914400" rtl="0" eaLnBrk="1" latinLnBrk="0" hangingPunct="1">
+              <a:lnSpc>
+                <a:spcPct val="90000"/>
+              </a:lnSpc>
+              <a:spcBef>
+                <a:spcPts val="1000"/>
+              </a:spcBef>
+              <a:buFont typeface="Arial" panose="020B0604020202020204" pitchFamily="34" charset="0"/>
+              <a:buChar char="•"/>
+              <a:defRPr sz="2200" kern="1200">
+                <a:solidFill>
+                  <a:schemeClr val="tx1"/>
+                </a:solidFill>
+                <a:latin typeface="+mn-lt"/>
+                <a:ea typeface="+mn-ea"/>
+                <a:cs typeface="+mn-cs"/>
+              </a:defRPr>
+            </a:lvl1pPr>
+            <a:lvl2pPr marL="685800" indent="-228600" algn="l" defTabSz="914400" rtl="0" eaLnBrk="1" latinLnBrk="0" hangingPunct="1">
+              <a:lnSpc>
+                <a:spcPct val="90000"/>
+              </a:lnSpc>
+              <a:spcBef>
+                <a:spcPts val="500"/>
+              </a:spcBef>
+              <a:buFont typeface="Arial" panose="020B0604020202020204" pitchFamily="34" charset="0"/>
+              <a:buChar char="•"/>
+              <a:defRPr sz="2000" kern="1200">
+                <a:solidFill>
+                  <a:schemeClr val="tx1"/>
+                </a:solidFill>
+                <a:latin typeface="+mn-lt"/>
+                <a:ea typeface="+mn-ea"/>
+                <a:cs typeface="+mn-cs"/>
+              </a:defRPr>
+            </a:lvl2pPr>
+            <a:lvl3pPr marL="1143000" indent="-228600" algn="l" defTabSz="914400" rtl="0" eaLnBrk="1" latinLnBrk="0" hangingPunct="1">
+              <a:lnSpc>
+                <a:spcPct val="90000"/>
+              </a:lnSpc>
+              <a:spcBef>
+                <a:spcPts val="500"/>
+              </a:spcBef>
+              <a:buFont typeface="Arial" panose="020B0604020202020204" pitchFamily="34" charset="0"/>
+              <a:buChar char="•"/>
+              <a:defRPr sz="1800" kern="1200">
+                <a:solidFill>
+                  <a:schemeClr val="tx1"/>
+                </a:solidFill>
+                <a:latin typeface="+mn-lt"/>
+                <a:ea typeface="+mn-ea"/>
+                <a:cs typeface="+mn-cs"/>
+              </a:defRPr>
+            </a:lvl3pPr>
+            <a:lvl4pPr marL="1600200" indent="-228600" algn="l" defTabSz="914400" rtl="0" eaLnBrk="1" latinLnBrk="0" hangingPunct="1">
+              <a:lnSpc>
+                <a:spcPct val="90000"/>
+              </a:lnSpc>
+              <a:spcBef>
+                <a:spcPts val="500"/>
+              </a:spcBef>
+              <a:buFont typeface="Arial" panose="020B0604020202020204" pitchFamily="34" charset="0"/>
+              <a:buChar char="•"/>
+              <a:defRPr sz="1600" kern="1200">
+                <a:solidFill>
+                  <a:schemeClr val="tx1"/>
+                </a:solidFill>
+                <a:latin typeface="+mn-lt"/>
+                <a:ea typeface="+mn-ea"/>
+                <a:cs typeface="+mn-cs"/>
+              </a:defRPr>
+            </a:lvl4pPr>
+            <a:lvl5pPr marL="2057400" indent="-228600" algn="l" defTabSz="914400" rtl="0" eaLnBrk="1" latinLnBrk="0" hangingPunct="1">
+              <a:lnSpc>
+                <a:spcPct val="90000"/>
+              </a:lnSpc>
+              <a:spcBef>
+                <a:spcPts val="500"/>
+              </a:spcBef>
+              <a:buFont typeface="Arial" panose="020B0604020202020204" pitchFamily="34" charset="0"/>
+              <a:buChar char="•"/>
+              <a:defRPr sz="1600" kern="1200">
+                <a:solidFill>
+                  <a:schemeClr val="tx1"/>
+                </a:solidFill>
+                <a:latin typeface="+mn-lt"/>
+                <a:ea typeface="+mn-ea"/>
+                <a:cs typeface="+mn-cs"/>
+              </a:defRPr>
+            </a:lvl5pPr>
+            <a:lvl6pPr marL="2514600" indent="-228600" algn="l" defTabSz="914400" rtl="0" eaLnBrk="1" latinLnBrk="0" hangingPunct="1">
+              <a:lnSpc>
+                <a:spcPct val="90000"/>
+              </a:lnSpc>
+              <a:spcBef>
+                <a:spcPts val="500"/>
+              </a:spcBef>
+              <a:buFont typeface="Arial" panose="020B0604020202020204" pitchFamily="34" charset="0"/>
+              <a:buChar char="•"/>
+              <a:defRPr sz="1600" kern="1200">
+                <a:solidFill>
+                  <a:schemeClr val="tx1"/>
+                </a:solidFill>
+                <a:latin typeface="+mn-lt"/>
+                <a:ea typeface="+mn-ea"/>
+                <a:cs typeface="+mn-cs"/>
+              </a:defRPr>
+            </a:lvl6pPr>
+            <a:lvl7pPr marL="2971800" indent="-228600" algn="l" defTabSz="914400" rtl="0" eaLnBrk="1" latinLnBrk="0" hangingPunct="1">
+              <a:lnSpc>
+                <a:spcPct val="90000"/>
+              </a:lnSpc>
+              <a:spcBef>
+                <a:spcPts val="500"/>
+              </a:spcBef>
+              <a:buFont typeface="Arial" panose="020B0604020202020204" pitchFamily="34" charset="0"/>
+              <a:buChar char="•"/>
+              <a:defRPr sz="1600" kern="1200">
+                <a:solidFill>
+                  <a:schemeClr val="tx1"/>
+                </a:solidFill>
+                <a:latin typeface="+mn-lt"/>
+                <a:ea typeface="+mn-ea"/>
+                <a:cs typeface="+mn-cs"/>
+              </a:defRPr>
+            </a:lvl7pPr>
+            <a:lvl8pPr marL="3429000" indent="-228600" algn="l" defTabSz="914400" rtl="0" eaLnBrk="1" latinLnBrk="0" hangingPunct="1">
+              <a:lnSpc>
+                <a:spcPct val="90000"/>
+              </a:lnSpc>
+              <a:spcBef>
+                <a:spcPts val="500"/>
+              </a:spcBef>
+              <a:buFont typeface="Arial" panose="020B0604020202020204" pitchFamily="34" charset="0"/>
+              <a:buChar char="•"/>
+              <a:defRPr sz="1600" kern="1200">
+                <a:solidFill>
+                  <a:schemeClr val="tx1"/>
+                </a:solidFill>
+                <a:latin typeface="+mn-lt"/>
+                <a:ea typeface="+mn-ea"/>
+                <a:cs typeface="+mn-cs"/>
+              </a:defRPr>
+            </a:lvl8pPr>
+            <a:lvl9pPr marL="3886200" indent="-228600" algn="l" defTabSz="914400" rtl="0" eaLnBrk="1" latinLnBrk="0" hangingPunct="1">
+              <a:lnSpc>
+                <a:spcPct val="90000"/>
+              </a:lnSpc>
+              <a:spcBef>
+                <a:spcPts val="500"/>
+              </a:spcBef>
+              <a:buFont typeface="Arial" panose="020B0604020202020204" pitchFamily="34" charset="0"/>
+              <a:buChar char="•"/>
+              <a:defRPr sz="1600" kern="1200">
+                <a:solidFill>
+                  <a:schemeClr val="tx1"/>
+                </a:solidFill>
+                <a:latin typeface="+mn-lt"/>
+                <a:ea typeface="+mn-ea"/>
+                <a:cs typeface="+mn-cs"/>
+              </a:defRPr>
+            </a:lvl9pPr>
+          </a:lstStyle>
+          <a:p>
+            <a:r>
+              <a:rPr lang="en-US" sz="1100" smtClean="0"/>
+              <a:t>D</a:t>
+            </a:r>
+            <a:endParaRPr lang="en-US" sz="1100" dirty="0"/>
           </a:p>
         </p:txBody>
       </p:sp>
@@ -6119,6 +6800,815 @@
   <p:clrMapOvr>
     <a:masterClrMapping/>
   </p:clrMapOvr>
+  <p:timing>
+    <p:tnLst>
+      <p:par>
+        <p:cTn id="1" dur="indefinite" restart="never" nodeType="tmRoot"/>
+      </p:par>
+    </p:tnLst>
+  </p:timing>
+</p:sld>
+</file>
+
+<file path=ppt/slides/slide4.xml><?xml version="1.0" encoding="utf-8"?>
+<p:sld xmlns:a="http://schemas.openxmlformats.org/drawingml/2006/main" xmlns:r="http://schemas.openxmlformats.org/officeDocument/2006/relationships" xmlns:p="http://schemas.openxmlformats.org/presentationml/2006/main">
+  <p:cSld>
+    <p:spTree>
+      <p:nvGrpSpPr>
+        <p:cNvPr id="1" name=""/>
+        <p:cNvGrpSpPr/>
+        <p:nvPr/>
+      </p:nvGrpSpPr>
+      <p:grpSpPr>
+        <a:xfrm>
+          <a:off x="0" y="0"/>
+          <a:ext cx="0" cy="0"/>
+          <a:chOff x="0" y="0"/>
+          <a:chExt cx="0" cy="0"/>
+        </a:xfrm>
+      </p:grpSpPr>
+      <p:sp>
+        <p:nvSpPr>
+          <p:cNvPr id="2" name="標題 1"/>
+          <p:cNvSpPr>
+            <a:spLocks noGrp="1"/>
+          </p:cNvSpPr>
+          <p:nvPr>
+            <p:ph type="title"/>
+          </p:nvPr>
+        </p:nvSpPr>
+        <p:spPr/>
+        <p:txBody>
+          <a:bodyPr/>
+          <a:lstStyle/>
+          <a:p>
+            <a:r>
+              <a:rPr lang="en-US" dirty="0" smtClean="0"/>
+              <a:t>Roles and </a:t>
+            </a:r>
+            <a:r>
+              <a:rPr lang="en-US" dirty="0" err="1" smtClean="0"/>
+              <a:t>REponsibilities</a:t>
+            </a:r>
+            <a:endParaRPr lang="en-US" dirty="0"/>
+          </a:p>
+        </p:txBody>
+      </p:sp>
+      <p:sp>
+        <p:nvSpPr>
+          <p:cNvPr id="3" name="內容版面配置區 2"/>
+          <p:cNvSpPr>
+            <a:spLocks noGrp="1"/>
+          </p:cNvSpPr>
+          <p:nvPr>
+            <p:ph idx="1"/>
+          </p:nvPr>
+        </p:nvSpPr>
+        <p:spPr/>
+        <p:txBody>
+          <a:bodyPr/>
+          <a:lstStyle/>
+          <a:p>
+            <a:r>
+              <a:rPr lang="en-US" dirty="0" smtClean="0"/>
+              <a:t>Front End</a:t>
+            </a:r>
+          </a:p>
+          <a:p>
+            <a:pPr marL="914400" lvl="1" indent="-457200">
+              <a:buFont typeface="+mj-lt"/>
+              <a:buAutoNum type="arabicPeriod"/>
+            </a:pPr>
+            <a:r>
+              <a:rPr lang="en-US" dirty="0" smtClean="0"/>
+              <a:t>Dominik (main)</a:t>
+            </a:r>
+          </a:p>
+          <a:p>
+            <a:pPr marL="914400" lvl="1" indent="-457200">
+              <a:buFont typeface="+mj-lt"/>
+              <a:buAutoNum type="arabicPeriod"/>
+            </a:pPr>
+            <a:r>
+              <a:rPr lang="en-US" dirty="0" smtClean="0"/>
+              <a:t>Wesley</a:t>
+            </a:r>
+            <a:endParaRPr lang="en-US" dirty="0"/>
+          </a:p>
+          <a:p>
+            <a:endParaRPr lang="en-US" dirty="0"/>
+          </a:p>
+          <a:p>
+            <a:r>
+              <a:rPr lang="en-US" dirty="0" smtClean="0"/>
+              <a:t>Back End</a:t>
+            </a:r>
+          </a:p>
+          <a:p>
+            <a:pPr marL="914400" lvl="1" indent="-457200">
+              <a:buFont typeface="+mj-lt"/>
+              <a:buAutoNum type="arabicPeriod"/>
+            </a:pPr>
+            <a:r>
+              <a:rPr lang="en-US" dirty="0" smtClean="0"/>
+              <a:t>Tri</a:t>
+            </a:r>
+          </a:p>
+          <a:p>
+            <a:pPr marL="914400" lvl="1" indent="-457200">
+              <a:buFont typeface="+mj-lt"/>
+              <a:buAutoNum type="arabicPeriod"/>
+            </a:pPr>
+            <a:r>
+              <a:rPr lang="en-US" dirty="0" smtClean="0"/>
+              <a:t>Sam</a:t>
+            </a:r>
+          </a:p>
+          <a:p>
+            <a:pPr marL="457200" indent="-457200">
+              <a:buFont typeface="+mj-lt"/>
+              <a:buAutoNum type="arabicPeriod"/>
+            </a:pPr>
+            <a:endParaRPr lang="en-US" dirty="0"/>
+          </a:p>
+          <a:p>
+            <a:r>
+              <a:rPr lang="en-US" dirty="0" smtClean="0"/>
+              <a:t>Version Control</a:t>
+            </a:r>
+            <a:r>
+              <a:rPr lang="zh-TW" altLang="en-US" dirty="0" smtClean="0"/>
+              <a:t>、</a:t>
+            </a:r>
+            <a:r>
+              <a:rPr lang="en-US" altLang="zh-TW" dirty="0" smtClean="0"/>
+              <a:t>Pipeline</a:t>
+            </a:r>
+            <a:r>
+              <a:rPr lang="zh-TW" altLang="en-US" dirty="0" smtClean="0"/>
+              <a:t>、</a:t>
+            </a:r>
+            <a:r>
+              <a:rPr lang="en-US" altLang="zh-TW" dirty="0" smtClean="0"/>
+              <a:t>Quality Control</a:t>
+            </a:r>
+          </a:p>
+          <a:p>
+            <a:pPr marL="914400" lvl="1" indent="-457200">
+              <a:buFont typeface="+mj-lt"/>
+              <a:buAutoNum type="arabicPeriod"/>
+            </a:pPr>
+            <a:r>
+              <a:rPr lang="en-US" dirty="0" smtClean="0"/>
+              <a:t>Sam</a:t>
+            </a:r>
+          </a:p>
+        </p:txBody>
+      </p:sp>
+    </p:spTree>
+    <p:extLst>
+      <p:ext uri="{BB962C8B-B14F-4D97-AF65-F5344CB8AC3E}">
+        <p14:creationId xmlns:p14="http://schemas.microsoft.com/office/powerpoint/2010/main" val="3142572881"/>
+      </p:ext>
+    </p:extLst>
+  </p:cSld>
+  <p:clrMapOvr>
+    <a:masterClrMapping/>
+  </p:clrMapOvr>
+</p:sld>
+</file>
+
+<file path=ppt/slides/slide5.xml><?xml version="1.0" encoding="utf-8"?>
+<p:sld xmlns:a="http://schemas.openxmlformats.org/drawingml/2006/main" xmlns:r="http://schemas.openxmlformats.org/officeDocument/2006/relationships" xmlns:p="http://schemas.openxmlformats.org/presentationml/2006/main">
+  <p:cSld>
+    <p:spTree>
+      <p:nvGrpSpPr>
+        <p:cNvPr id="1" name=""/>
+        <p:cNvGrpSpPr/>
+        <p:nvPr/>
+      </p:nvGrpSpPr>
+      <p:grpSpPr>
+        <a:xfrm>
+          <a:off x="0" y="0"/>
+          <a:ext cx="0" cy="0"/>
+          <a:chOff x="0" y="0"/>
+          <a:chExt cx="0" cy="0"/>
+        </a:xfrm>
+      </p:grpSpPr>
+      <p:sp>
+        <p:nvSpPr>
+          <p:cNvPr id="4" name="標題 3"/>
+          <p:cNvSpPr>
+            <a:spLocks noGrp="1"/>
+          </p:cNvSpPr>
+          <p:nvPr>
+            <p:ph type="ctrTitle"/>
+          </p:nvPr>
+        </p:nvSpPr>
+        <p:spPr/>
+        <p:txBody>
+          <a:bodyPr/>
+          <a:lstStyle/>
+          <a:p>
+            <a:pPr algn="ctr"/>
+            <a:r>
+              <a:rPr lang="en-US" dirty="0" smtClean="0"/>
+              <a:t>Demo Time !!</a:t>
+            </a:r>
+            <a:endParaRPr lang="en-US" dirty="0"/>
+          </a:p>
+        </p:txBody>
+      </p:sp>
+      <p:sp>
+        <p:nvSpPr>
+          <p:cNvPr id="5" name="副標題 4"/>
+          <p:cNvSpPr>
+            <a:spLocks noGrp="1"/>
+          </p:cNvSpPr>
+          <p:nvPr>
+            <p:ph type="subTitle" idx="1"/>
+          </p:nvPr>
+        </p:nvSpPr>
+        <p:spPr/>
+        <p:txBody>
+          <a:bodyPr/>
+          <a:lstStyle/>
+          <a:p>
+            <a:endParaRPr lang="en-US"/>
+          </a:p>
+        </p:txBody>
+      </p:sp>
+    </p:spTree>
+    <p:extLst>
+      <p:ext uri="{BB962C8B-B14F-4D97-AF65-F5344CB8AC3E}">
+        <p14:creationId xmlns:p14="http://schemas.microsoft.com/office/powerpoint/2010/main" val="967652640"/>
+      </p:ext>
+    </p:extLst>
+  </p:cSld>
+  <p:clrMapOvr>
+    <a:masterClrMapping/>
+  </p:clrMapOvr>
+  <p:timing>
+    <p:tnLst>
+      <p:par>
+        <p:cTn id="1" dur="indefinite" restart="never" nodeType="tmRoot"/>
+      </p:par>
+    </p:tnLst>
+  </p:timing>
+</p:sld>
+</file>
+
+<file path=ppt/slides/slide6.xml><?xml version="1.0" encoding="utf-8"?>
+<p:sld xmlns:a="http://schemas.openxmlformats.org/drawingml/2006/main" xmlns:r="http://schemas.openxmlformats.org/officeDocument/2006/relationships" xmlns:p="http://schemas.openxmlformats.org/presentationml/2006/main">
+  <p:cSld>
+    <p:spTree>
+      <p:nvGrpSpPr>
+        <p:cNvPr id="1" name=""/>
+        <p:cNvGrpSpPr/>
+        <p:nvPr/>
+      </p:nvGrpSpPr>
+      <p:grpSpPr>
+        <a:xfrm>
+          <a:off x="0" y="0"/>
+          <a:ext cx="0" cy="0"/>
+          <a:chOff x="0" y="0"/>
+          <a:chExt cx="0" cy="0"/>
+        </a:xfrm>
+      </p:grpSpPr>
+      <p:sp>
+        <p:nvSpPr>
+          <p:cNvPr id="2" name="標題 1"/>
+          <p:cNvSpPr>
+            <a:spLocks noGrp="1"/>
+          </p:cNvSpPr>
+          <p:nvPr>
+            <p:ph type="title"/>
+          </p:nvPr>
+        </p:nvSpPr>
+        <p:spPr/>
+        <p:txBody>
+          <a:bodyPr/>
+          <a:lstStyle/>
+          <a:p>
+            <a:endParaRPr lang="en-US"/>
+          </a:p>
+        </p:txBody>
+      </p:sp>
+      <p:pic>
+        <p:nvPicPr>
+          <p:cNvPr id="4" name="內容版面配置區 3"/>
+          <p:cNvPicPr>
+            <a:picLocks noGrp="1" noChangeAspect="1"/>
+          </p:cNvPicPr>
+          <p:nvPr>
+            <p:ph idx="1"/>
+          </p:nvPr>
+        </p:nvPicPr>
+        <p:blipFill>
+          <a:blip r:embed="rId2">
+            <a:extLst>
+              <a:ext uri="{28A0092B-C50C-407E-A947-70E740481C1C}">
+                <a14:useLocalDpi xmlns:a14="http://schemas.microsoft.com/office/drawing/2010/main" val="0"/>
+              </a:ext>
+            </a:extLst>
+          </a:blip>
+          <a:stretch>
+            <a:fillRect/>
+          </a:stretch>
+        </p:blipFill>
+        <p:spPr>
+          <a:xfrm>
+            <a:off x="1607" y="1195754"/>
+            <a:ext cx="12190393" cy="4070837"/>
+          </a:xfrm>
+        </p:spPr>
+      </p:pic>
+    </p:spTree>
+    <p:extLst>
+      <p:ext uri="{BB962C8B-B14F-4D97-AF65-F5344CB8AC3E}">
+        <p14:creationId xmlns:p14="http://schemas.microsoft.com/office/powerpoint/2010/main" val="1600621481"/>
+      </p:ext>
+    </p:extLst>
+  </p:cSld>
+  <p:clrMapOvr>
+    <a:masterClrMapping/>
+  </p:clrMapOvr>
+</p:sld>
+</file>
+
+<file path=ppt/slides/slide7.xml><?xml version="1.0" encoding="utf-8"?>
+<p:sld xmlns:a="http://schemas.openxmlformats.org/drawingml/2006/main" xmlns:r="http://schemas.openxmlformats.org/officeDocument/2006/relationships" xmlns:p="http://schemas.openxmlformats.org/presentationml/2006/main">
+  <p:cSld>
+    <p:spTree>
+      <p:nvGrpSpPr>
+        <p:cNvPr id="1" name=""/>
+        <p:cNvGrpSpPr/>
+        <p:nvPr/>
+      </p:nvGrpSpPr>
+      <p:grpSpPr>
+        <a:xfrm>
+          <a:off x="0" y="0"/>
+          <a:ext cx="0" cy="0"/>
+          <a:chOff x="0" y="0"/>
+          <a:chExt cx="0" cy="0"/>
+        </a:xfrm>
+      </p:grpSpPr>
+      <p:sp>
+        <p:nvSpPr>
+          <p:cNvPr id="2" name="標題 1"/>
+          <p:cNvSpPr>
+            <a:spLocks noGrp="1"/>
+          </p:cNvSpPr>
+          <p:nvPr>
+            <p:ph type="title" idx="4294967295"/>
+          </p:nvPr>
+        </p:nvSpPr>
+        <p:spPr>
+          <a:xfrm>
+            <a:off x="3581400" y="763588"/>
+            <a:ext cx="8610600" cy="1293812"/>
+          </a:xfrm>
+        </p:spPr>
+        <p:txBody>
+          <a:bodyPr/>
+          <a:lstStyle/>
+          <a:p>
+            <a:endParaRPr lang="en-US" dirty="0"/>
+          </a:p>
+        </p:txBody>
+      </p:sp>
+      <p:pic>
+        <p:nvPicPr>
+          <p:cNvPr id="4" name="圖片 3"/>
+          <p:cNvPicPr>
+            <a:picLocks noChangeAspect="1"/>
+          </p:cNvPicPr>
+          <p:nvPr/>
+        </p:nvPicPr>
+        <p:blipFill>
+          <a:blip r:embed="rId2">
+            <a:extLst>
+              <a:ext uri="{28A0092B-C50C-407E-A947-70E740481C1C}">
+                <a14:useLocalDpi xmlns:a14="http://schemas.microsoft.com/office/drawing/2010/main" val="0"/>
+              </a:ext>
+            </a:extLst>
+          </a:blip>
+          <a:stretch>
+            <a:fillRect/>
+          </a:stretch>
+        </p:blipFill>
+        <p:spPr>
+          <a:xfrm>
+            <a:off x="2614912" y="0"/>
+            <a:ext cx="6944591" cy="6858000"/>
+          </a:xfrm>
+          <a:prstGeom prst="rect">
+            <a:avLst/>
+          </a:prstGeom>
+        </p:spPr>
+      </p:pic>
+      <p:sp>
+        <p:nvSpPr>
+          <p:cNvPr id="5" name="副標題 2"/>
+          <p:cNvSpPr txBox="1">
+            <a:spLocks/>
+          </p:cNvSpPr>
+          <p:nvPr/>
+        </p:nvSpPr>
+        <p:spPr>
+          <a:xfrm>
+            <a:off x="-175846" y="6576647"/>
+            <a:ext cx="9448800" cy="685800"/>
+          </a:xfrm>
+          <a:prstGeom prst="rect">
+            <a:avLst/>
+          </a:prstGeom>
+        </p:spPr>
+        <p:txBody>
+          <a:bodyPr>
+            <a:normAutofit/>
+          </a:bodyPr>
+          <a:lstStyle>
+            <a:lvl1pPr marL="228600" indent="-228600" algn="l" defTabSz="914400" rtl="0" eaLnBrk="1" latinLnBrk="0" hangingPunct="1">
+              <a:lnSpc>
+                <a:spcPct val="90000"/>
+              </a:lnSpc>
+              <a:spcBef>
+                <a:spcPts val="1000"/>
+              </a:spcBef>
+              <a:buFont typeface="Arial" panose="020B0604020202020204" pitchFamily="34" charset="0"/>
+              <a:buChar char="•"/>
+              <a:defRPr sz="2200" kern="1200">
+                <a:solidFill>
+                  <a:schemeClr val="tx1"/>
+                </a:solidFill>
+                <a:latin typeface="+mn-lt"/>
+                <a:ea typeface="+mn-ea"/>
+                <a:cs typeface="+mn-cs"/>
+              </a:defRPr>
+            </a:lvl1pPr>
+            <a:lvl2pPr marL="685800" indent="-228600" algn="l" defTabSz="914400" rtl="0" eaLnBrk="1" latinLnBrk="0" hangingPunct="1">
+              <a:lnSpc>
+                <a:spcPct val="90000"/>
+              </a:lnSpc>
+              <a:spcBef>
+                <a:spcPts val="500"/>
+              </a:spcBef>
+              <a:buFont typeface="Arial" panose="020B0604020202020204" pitchFamily="34" charset="0"/>
+              <a:buChar char="•"/>
+              <a:defRPr sz="2000" kern="1200">
+                <a:solidFill>
+                  <a:schemeClr val="tx1"/>
+                </a:solidFill>
+                <a:latin typeface="+mn-lt"/>
+                <a:ea typeface="+mn-ea"/>
+                <a:cs typeface="+mn-cs"/>
+              </a:defRPr>
+            </a:lvl2pPr>
+            <a:lvl3pPr marL="1143000" indent="-228600" algn="l" defTabSz="914400" rtl="0" eaLnBrk="1" latinLnBrk="0" hangingPunct="1">
+              <a:lnSpc>
+                <a:spcPct val="90000"/>
+              </a:lnSpc>
+              <a:spcBef>
+                <a:spcPts val="500"/>
+              </a:spcBef>
+              <a:buFont typeface="Arial" panose="020B0604020202020204" pitchFamily="34" charset="0"/>
+              <a:buChar char="•"/>
+              <a:defRPr sz="1800" kern="1200">
+                <a:solidFill>
+                  <a:schemeClr val="tx1"/>
+                </a:solidFill>
+                <a:latin typeface="+mn-lt"/>
+                <a:ea typeface="+mn-ea"/>
+                <a:cs typeface="+mn-cs"/>
+              </a:defRPr>
+            </a:lvl3pPr>
+            <a:lvl4pPr marL="1600200" indent="-228600" algn="l" defTabSz="914400" rtl="0" eaLnBrk="1" latinLnBrk="0" hangingPunct="1">
+              <a:lnSpc>
+                <a:spcPct val="90000"/>
+              </a:lnSpc>
+              <a:spcBef>
+                <a:spcPts val="500"/>
+              </a:spcBef>
+              <a:buFont typeface="Arial" panose="020B0604020202020204" pitchFamily="34" charset="0"/>
+              <a:buChar char="•"/>
+              <a:defRPr sz="1600" kern="1200">
+                <a:solidFill>
+                  <a:schemeClr val="tx1"/>
+                </a:solidFill>
+                <a:latin typeface="+mn-lt"/>
+                <a:ea typeface="+mn-ea"/>
+                <a:cs typeface="+mn-cs"/>
+              </a:defRPr>
+            </a:lvl4pPr>
+            <a:lvl5pPr marL="2057400" indent="-228600" algn="l" defTabSz="914400" rtl="0" eaLnBrk="1" latinLnBrk="0" hangingPunct="1">
+              <a:lnSpc>
+                <a:spcPct val="90000"/>
+              </a:lnSpc>
+              <a:spcBef>
+                <a:spcPts val="500"/>
+              </a:spcBef>
+              <a:buFont typeface="Arial" panose="020B0604020202020204" pitchFamily="34" charset="0"/>
+              <a:buChar char="•"/>
+              <a:defRPr sz="1600" kern="1200">
+                <a:solidFill>
+                  <a:schemeClr val="tx1"/>
+                </a:solidFill>
+                <a:latin typeface="+mn-lt"/>
+                <a:ea typeface="+mn-ea"/>
+                <a:cs typeface="+mn-cs"/>
+              </a:defRPr>
+            </a:lvl5pPr>
+            <a:lvl6pPr marL="2514600" indent="-228600" algn="l" defTabSz="914400" rtl="0" eaLnBrk="1" latinLnBrk="0" hangingPunct="1">
+              <a:lnSpc>
+                <a:spcPct val="90000"/>
+              </a:lnSpc>
+              <a:spcBef>
+                <a:spcPts val="500"/>
+              </a:spcBef>
+              <a:buFont typeface="Arial" panose="020B0604020202020204" pitchFamily="34" charset="0"/>
+              <a:buChar char="•"/>
+              <a:defRPr sz="1600" kern="1200">
+                <a:solidFill>
+                  <a:schemeClr val="tx1"/>
+                </a:solidFill>
+                <a:latin typeface="+mn-lt"/>
+                <a:ea typeface="+mn-ea"/>
+                <a:cs typeface="+mn-cs"/>
+              </a:defRPr>
+            </a:lvl6pPr>
+            <a:lvl7pPr marL="2971800" indent="-228600" algn="l" defTabSz="914400" rtl="0" eaLnBrk="1" latinLnBrk="0" hangingPunct="1">
+              <a:lnSpc>
+                <a:spcPct val="90000"/>
+              </a:lnSpc>
+              <a:spcBef>
+                <a:spcPts val="500"/>
+              </a:spcBef>
+              <a:buFont typeface="Arial" panose="020B0604020202020204" pitchFamily="34" charset="0"/>
+              <a:buChar char="•"/>
+              <a:defRPr sz="1600" kern="1200">
+                <a:solidFill>
+                  <a:schemeClr val="tx1"/>
+                </a:solidFill>
+                <a:latin typeface="+mn-lt"/>
+                <a:ea typeface="+mn-ea"/>
+                <a:cs typeface="+mn-cs"/>
+              </a:defRPr>
+            </a:lvl7pPr>
+            <a:lvl8pPr marL="3429000" indent="-228600" algn="l" defTabSz="914400" rtl="0" eaLnBrk="1" latinLnBrk="0" hangingPunct="1">
+              <a:lnSpc>
+                <a:spcPct val="90000"/>
+              </a:lnSpc>
+              <a:spcBef>
+                <a:spcPts val="500"/>
+              </a:spcBef>
+              <a:buFont typeface="Arial" panose="020B0604020202020204" pitchFamily="34" charset="0"/>
+              <a:buChar char="•"/>
+              <a:defRPr sz="1600" kern="1200">
+                <a:solidFill>
+                  <a:schemeClr val="tx1"/>
+                </a:solidFill>
+                <a:latin typeface="+mn-lt"/>
+                <a:ea typeface="+mn-ea"/>
+                <a:cs typeface="+mn-cs"/>
+              </a:defRPr>
+            </a:lvl8pPr>
+            <a:lvl9pPr marL="3886200" indent="-228600" algn="l" defTabSz="914400" rtl="0" eaLnBrk="1" latinLnBrk="0" hangingPunct="1">
+              <a:lnSpc>
+                <a:spcPct val="90000"/>
+              </a:lnSpc>
+              <a:spcBef>
+                <a:spcPts val="500"/>
+              </a:spcBef>
+              <a:buFont typeface="Arial" panose="020B0604020202020204" pitchFamily="34" charset="0"/>
+              <a:buChar char="•"/>
+              <a:defRPr sz="1600" kern="1200">
+                <a:solidFill>
+                  <a:schemeClr val="tx1"/>
+                </a:solidFill>
+                <a:latin typeface="+mn-lt"/>
+                <a:ea typeface="+mn-ea"/>
+                <a:cs typeface="+mn-cs"/>
+              </a:defRPr>
+            </a:lvl9pPr>
+          </a:lstStyle>
+          <a:p>
+            <a:r>
+              <a:rPr lang="en-US" sz="1100" dirty="0" smtClean="0"/>
+              <a:t>S</a:t>
+            </a:r>
+            <a:endParaRPr lang="en-US" sz="1100" dirty="0"/>
+          </a:p>
+        </p:txBody>
+      </p:sp>
+    </p:spTree>
+    <p:extLst>
+      <p:ext uri="{BB962C8B-B14F-4D97-AF65-F5344CB8AC3E}">
+        <p14:creationId xmlns:p14="http://schemas.microsoft.com/office/powerpoint/2010/main" val="3908917819"/>
+      </p:ext>
+    </p:extLst>
+  </p:cSld>
+  <p:clrMapOvr>
+    <a:masterClrMapping/>
+  </p:clrMapOvr>
+  <p:timing>
+    <p:tnLst>
+      <p:par>
+        <p:cTn id="1" dur="indefinite" restart="never" nodeType="tmRoot"/>
+      </p:par>
+    </p:tnLst>
+  </p:timing>
+</p:sld>
+</file>
+
+<file path=ppt/slides/slide8.xml><?xml version="1.0" encoding="utf-8"?>
+<p:sld xmlns:a="http://schemas.openxmlformats.org/drawingml/2006/main" xmlns:r="http://schemas.openxmlformats.org/officeDocument/2006/relationships" xmlns:p="http://schemas.openxmlformats.org/presentationml/2006/main">
+  <p:cSld>
+    <p:spTree>
+      <p:nvGrpSpPr>
+        <p:cNvPr id="1" name=""/>
+        <p:cNvGrpSpPr/>
+        <p:nvPr/>
+      </p:nvGrpSpPr>
+      <p:grpSpPr>
+        <a:xfrm>
+          <a:off x="0" y="0"/>
+          <a:ext cx="0" cy="0"/>
+          <a:chOff x="0" y="0"/>
+          <a:chExt cx="0" cy="0"/>
+        </a:xfrm>
+      </p:grpSpPr>
+      <p:pic>
+        <p:nvPicPr>
+          <p:cNvPr id="2" name="圖片 1"/>
+          <p:cNvPicPr>
+            <a:picLocks noChangeAspect="1"/>
+          </p:cNvPicPr>
+          <p:nvPr/>
+        </p:nvPicPr>
+        <p:blipFill>
+          <a:blip r:embed="rId2">
+            <a:extLst>
+              <a:ext uri="{28A0092B-C50C-407E-A947-70E740481C1C}">
+                <a14:useLocalDpi xmlns:a14="http://schemas.microsoft.com/office/drawing/2010/main" val="0"/>
+              </a:ext>
+            </a:extLst>
+          </a:blip>
+          <a:stretch>
+            <a:fillRect/>
+          </a:stretch>
+        </p:blipFill>
+        <p:spPr>
+          <a:xfrm>
+            <a:off x="1733951" y="0"/>
+            <a:ext cx="9058206" cy="6858000"/>
+          </a:xfrm>
+          <a:prstGeom prst="rect">
+            <a:avLst/>
+          </a:prstGeom>
+        </p:spPr>
+      </p:pic>
+    </p:spTree>
+    <p:extLst>
+      <p:ext uri="{BB962C8B-B14F-4D97-AF65-F5344CB8AC3E}">
+        <p14:creationId xmlns:p14="http://schemas.microsoft.com/office/powerpoint/2010/main" val="1143585146"/>
+      </p:ext>
+    </p:extLst>
+  </p:cSld>
+  <p:clrMapOvr>
+    <a:masterClrMapping/>
+  </p:clrMapOvr>
+  <p:timing>
+    <p:tnLst>
+      <p:par>
+        <p:cTn id="1" dur="indefinite" restart="never" nodeType="tmRoot"/>
+      </p:par>
+    </p:tnLst>
+  </p:timing>
+</p:sld>
+</file>
+
+<file path=ppt/slides/slide9.xml><?xml version="1.0" encoding="utf-8"?>
+<p:sld xmlns:a="http://schemas.openxmlformats.org/drawingml/2006/main" xmlns:r="http://schemas.openxmlformats.org/officeDocument/2006/relationships" xmlns:p="http://schemas.openxmlformats.org/presentationml/2006/main">
+  <p:cSld>
+    <p:spTree>
+      <p:nvGrpSpPr>
+        <p:cNvPr id="1" name=""/>
+        <p:cNvGrpSpPr/>
+        <p:nvPr/>
+      </p:nvGrpSpPr>
+      <p:grpSpPr>
+        <a:xfrm>
+          <a:off x="0" y="0"/>
+          <a:ext cx="0" cy="0"/>
+          <a:chOff x="0" y="0"/>
+          <a:chExt cx="0" cy="0"/>
+        </a:xfrm>
+      </p:grpSpPr>
+      <p:sp>
+        <p:nvSpPr>
+          <p:cNvPr id="2" name="標題 1"/>
+          <p:cNvSpPr>
+            <a:spLocks noGrp="1"/>
+          </p:cNvSpPr>
+          <p:nvPr>
+            <p:ph type="title"/>
+          </p:nvPr>
+        </p:nvSpPr>
+        <p:spPr/>
+        <p:txBody>
+          <a:bodyPr/>
+          <a:lstStyle/>
+          <a:p>
+            <a:r>
+              <a:rPr lang="en-US" dirty="0" smtClean="0"/>
+              <a:t>What if…</a:t>
+            </a:r>
+            <a:endParaRPr lang="en-US" dirty="0"/>
+          </a:p>
+        </p:txBody>
+      </p:sp>
+      <p:sp>
+        <p:nvSpPr>
+          <p:cNvPr id="3" name="內容版面配置區 2"/>
+          <p:cNvSpPr>
+            <a:spLocks noGrp="1"/>
+          </p:cNvSpPr>
+          <p:nvPr>
+            <p:ph idx="1"/>
+          </p:nvPr>
+        </p:nvSpPr>
+        <p:spPr/>
+        <p:txBody>
+          <a:bodyPr/>
+          <a:lstStyle/>
+          <a:p>
+            <a:r>
+              <a:rPr lang="en-US" sz="2800" dirty="0" smtClean="0"/>
+              <a:t>Complete full CRUD functions from UI(Angular)</a:t>
+            </a:r>
+          </a:p>
+          <a:p>
+            <a:r>
+              <a:rPr lang="en-US" sz="2800" dirty="0" smtClean="0"/>
+              <a:t>Polish the Web page for a sleeker and more responsive design </a:t>
+            </a:r>
+          </a:p>
+          <a:p>
+            <a:r>
+              <a:rPr lang="en-US" sz="2800" dirty="0"/>
+              <a:t>U</a:t>
+            </a:r>
+            <a:r>
+              <a:rPr lang="en-US" sz="2800" dirty="0" smtClean="0"/>
+              <a:t>tilize 3</a:t>
+            </a:r>
+            <a:r>
+              <a:rPr lang="en-US" sz="2800" baseline="30000" dirty="0" smtClean="0"/>
+              <a:t>rd</a:t>
+            </a:r>
+            <a:r>
+              <a:rPr lang="en-US" sz="2800" dirty="0" smtClean="0"/>
+              <a:t> party API</a:t>
+            </a:r>
+          </a:p>
+          <a:p>
+            <a:r>
+              <a:rPr lang="en-US" sz="2800" dirty="0" smtClean="0"/>
+              <a:t>Achieve 50% or higher code coverage on Angular</a:t>
+            </a:r>
+          </a:p>
+          <a:p>
+            <a:r>
+              <a:rPr lang="en-US" sz="2800" dirty="0" smtClean="0"/>
+              <a:t>Implement standard client and server side validation </a:t>
+            </a:r>
+          </a:p>
+          <a:p>
+            <a:pPr marL="0" indent="0">
+              <a:buNone/>
+            </a:pPr>
+            <a:endParaRPr lang="en-US" dirty="0"/>
+          </a:p>
+        </p:txBody>
+      </p:sp>
+    </p:spTree>
+    <p:extLst>
+      <p:ext uri="{BB962C8B-B14F-4D97-AF65-F5344CB8AC3E}">
+        <p14:creationId xmlns:p14="http://schemas.microsoft.com/office/powerpoint/2010/main" val="3778378492"/>
+      </p:ext>
+    </p:extLst>
+  </p:cSld>
+  <p:clrMapOvr>
+    <a:masterClrMapping/>
+  </p:clrMapOvr>
+  <p:timing>
+    <p:tnLst>
+      <p:par>
+        <p:cTn id="1" dur="indefinite" restart="never" nodeType="tmRoot"/>
+      </p:par>
+    </p:tnLst>
+  </p:timing>
 </p:sld>
 </file>
 

</xml_diff>